<commit_message>
M1_OriginMonitor  // Simulation 임시 패스  todo : System Plan Real에 초기값(상태저장) 기능 완성시 까지 대기
</commit_message>
<xml_diff>
--- a/DsDotNet/src/UnitTest/UnitTest.Model/ImportOfficeExample/Sample/Lib/Cylinder/Double.pptx
+++ b/DsDotNet/src/UnitTest/UnitTest.Model/ImportOfficeExample/Sample/Lib/Cylinder/Double.pptx
@@ -756,7 +756,7 @@
           <a:effectLst/>
           <a:extLst>
             <a:ext uri="{91240B29-F687-4f45-9708-019B960494DF}">
-              <a14:hiddenLine xmlns="" xmlns:a14="http://schemas.microsoft.com/office/drawing/2010/main" w="9525">
+              <a14:hiddenLine xmlns:a14="http://schemas.microsoft.com/office/drawing/2010/main" xmlns="" w="9525">
                 <a:solidFill>
                   <a:srgbClr val="000000"/>
                 </a:solidFill>
@@ -2278,7 +2278,7 @@
           <a:ln/>
           <a:extLst>
             <a:ext uri="{91240B29-F687-4f45-9708-019B960494DF}">
-              <a14:hiddenLine xmlns="" xmlns:a14="http://schemas.microsoft.com/office/drawing/2010/main" w="9525">
+              <a14:hiddenLine xmlns:a14="http://schemas.microsoft.com/office/drawing/2010/main" xmlns="" w="9525">
                 <a:solidFill>
                   <a:srgbClr val="000000"/>
                 </a:solidFill>
@@ -2553,7 +2553,7 @@
           <a:ln/>
           <a:extLst>
             <a:ext uri="{91240B29-F687-4f45-9708-019B960494DF}">
-              <a14:hiddenLine xmlns="" xmlns:a14="http://schemas.microsoft.com/office/drawing/2010/main" w="9525">
+              <a14:hiddenLine xmlns:a14="http://schemas.microsoft.com/office/drawing/2010/main" xmlns="" w="9525">
                 <a:solidFill>
                   <a:srgbClr val="000000"/>
                 </a:solidFill>
@@ -2954,7 +2954,7 @@
           <a:ln/>
           <a:extLst>
             <a:ext uri="{91240B29-F687-4f45-9708-019B960494DF}">
-              <a14:hiddenLine xmlns="" xmlns:a14="http://schemas.microsoft.com/office/drawing/2010/main" w="9525">
+              <a14:hiddenLine xmlns:a14="http://schemas.microsoft.com/office/drawing/2010/main" xmlns="" w="9525">
                 <a:solidFill>
                   <a:srgbClr val="000000"/>
                 </a:solidFill>
@@ -3580,7 +3580,7 @@
           <a:ln/>
           <a:extLst>
             <a:ext uri="{91240B29-F687-4f45-9708-019B960494DF}">
-              <a14:hiddenLine xmlns="" xmlns:a14="http://schemas.microsoft.com/office/drawing/2010/main" w="9525">
+              <a14:hiddenLine xmlns:a14="http://schemas.microsoft.com/office/drawing/2010/main" xmlns="" w="9525">
                 <a:solidFill>
                   <a:srgbClr val="000000"/>
                 </a:solidFill>
@@ -3919,7 +3919,7 @@
           <a:ln/>
           <a:extLst>
             <a:ext uri="{91240B29-F687-4f45-9708-019B960494DF}">
-              <a14:hiddenLine xmlns="" xmlns:a14="http://schemas.microsoft.com/office/drawing/2010/main" w="9525">
+              <a14:hiddenLine xmlns:a14="http://schemas.microsoft.com/office/drawing/2010/main" xmlns="" w="9525">
                 <a:solidFill>
                   <a:srgbClr val="000000"/>
                 </a:solidFill>
@@ -4604,7 +4604,7 @@
           <a:ln/>
           <a:extLst>
             <a:ext uri="{91240B29-F687-4f45-9708-019B960494DF}">
-              <a14:hiddenLine xmlns="" xmlns:a14="http://schemas.microsoft.com/office/drawing/2010/main" w="9525">
+              <a14:hiddenLine xmlns:a14="http://schemas.microsoft.com/office/drawing/2010/main" xmlns="" w="9525">
                 <a:solidFill>
                   <a:srgbClr val="000000"/>
                 </a:solidFill>
@@ -7194,13 +7194,6 @@
             <a:pPr algn="ctr"/>
             <a:r>
               <a:rPr lang="en-US" altLang="ko-KR" sz="1200" dirty="0"/>
-              <a:t>Valve</a:t>
-            </a:r>
-          </a:p>
-          <a:p>
-            <a:pPr algn="ctr"/>
-            <a:r>
-              <a:rPr lang="en-US" altLang="ko-KR" sz="1200" dirty="0"/>
               <a:t>ADV</a:t>
             </a:r>
             <a:endParaRPr lang="ko-KR" altLang="en-US" sz="1200" dirty="0"/>
@@ -7257,13 +7250,6 @@
             <a:pPr algn="ctr"/>
             <a:r>
               <a:rPr lang="en-US" altLang="ko-KR" sz="1200" dirty="0"/>
-              <a:t>Valve</a:t>
-            </a:r>
-          </a:p>
-          <a:p>
-            <a:pPr algn="ctr"/>
-            <a:r>
-              <a:rPr lang="en-US" altLang="ko-KR" sz="1200" dirty="0"/>
               <a:t>RET</a:t>
             </a:r>
             <a:endParaRPr lang="ko-KR" altLang="en-US" sz="1200" dirty="0"/>
@@ -7339,7 +7325,7 @@
             </a:r>
             <a:r>
               <a:rPr lang="en-US" altLang="ko-KR" sz="1400" dirty="0"/>
-              <a:t>ValveADV </a:t>
+              <a:t>ADV </a:t>
             </a:r>
             <a:r>
               <a:rPr lang="en-US" altLang="ko-KR" sz="1400" dirty="0">
@@ -7349,7 +7335,7 @@
             </a:r>
             <a:r>
               <a:rPr lang="en-US" altLang="ko-KR" sz="1400" dirty="0"/>
-              <a:t>ValveADV</a:t>
+              <a:t>ADV</a:t>
             </a:r>
             <a:r>
               <a:rPr lang="en-US" altLang="ko-KR" sz="1400" dirty="0">
@@ -7432,7 +7418,7 @@
             </a:r>
             <a:r>
               <a:rPr lang="en-US" altLang="ko-KR" sz="1400" dirty="0"/>
-              <a:t>ValveRET </a:t>
+              <a:t>RET </a:t>
             </a:r>
             <a:r>
               <a:rPr lang="en-US" altLang="ko-KR" sz="1400" dirty="0">
@@ -7442,7 +7428,7 @@
             </a:r>
             <a:r>
               <a:rPr lang="en-US" altLang="ko-KR" sz="1400" dirty="0"/>
-              <a:t>ValveRET</a:t>
+              <a:t>RET</a:t>
             </a:r>
             <a:r>
               <a:rPr lang="en-US" altLang="ko-KR" sz="1400" dirty="0">

</xml_diff>